<commit_message>
added required items to poster (content still needs filling)
see summary
</commit_message>
<xml_diff>
--- a/wiki_assets/files/poster_template.pptx
+++ b/wiki_assets/files/poster_template.pptx
@@ -1776,14 +1776,14 @@
           </a:ln>
           <a:extLst>
             <a:ext uri="{909E8E84-426E-40dd-AFC4-6F175D3DCCD1}">
-              <a14:hiddenFill xmlns:a14="http://schemas.microsoft.com/office/drawing/2010/main" xmlns="">
+              <a14:hiddenFill xmlns="" xmlns:a14="http://schemas.microsoft.com/office/drawing/2010/main">
                 <a:solidFill>
                   <a:srgbClr val="FFFFFF"/>
                 </a:solidFill>
               </a14:hiddenFill>
             </a:ext>
             <a:ext uri="{91240B29-F687-4f45-9708-019B960494DF}">
-              <a14:hiddenLine xmlns:a14="http://schemas.microsoft.com/office/drawing/2010/main" xmlns="" w="9525">
+              <a14:hiddenLine xmlns="" xmlns:a14="http://schemas.microsoft.com/office/drawing/2010/main" w="9525">
                 <a:solidFill>
                   <a:srgbClr val="000000"/>
                 </a:solidFill>
@@ -1835,14 +1835,14 @@
           </a:ln>
           <a:extLst>
             <a:ext uri="{909E8E84-426E-40dd-AFC4-6F175D3DCCD1}">
-              <a14:hiddenFill xmlns:a14="http://schemas.microsoft.com/office/drawing/2010/main" xmlns="">
+              <a14:hiddenFill xmlns="" xmlns:a14="http://schemas.microsoft.com/office/drawing/2010/main">
                 <a:solidFill>
                   <a:srgbClr val="FFFFFF"/>
                 </a:solidFill>
               </a14:hiddenFill>
             </a:ext>
             <a:ext uri="{91240B29-F687-4f45-9708-019B960494DF}">
-              <a14:hiddenLine xmlns:a14="http://schemas.microsoft.com/office/drawing/2010/main" xmlns="" w="9525">
+              <a14:hiddenLine xmlns="" xmlns:a14="http://schemas.microsoft.com/office/drawing/2010/main" w="9525">
                 <a:solidFill>
                   <a:srgbClr val="000000"/>
                 </a:solidFill>
@@ -3355,14 +3355,14 @@
           </a:ln>
           <a:extLst>
             <a:ext uri="{909E8E84-426E-40dd-AFC4-6F175D3DCCD1}">
-              <a14:hiddenFill xmlns:a14="http://schemas.microsoft.com/office/drawing/2010/main" xmlns="">
+              <a14:hiddenFill xmlns="" xmlns:a14="http://schemas.microsoft.com/office/drawing/2010/main">
                 <a:solidFill>
                   <a:srgbClr val="FFFFFF"/>
                 </a:solidFill>
               </a14:hiddenFill>
             </a:ext>
             <a:ext uri="{91240B29-F687-4f45-9708-019B960494DF}">
-              <a14:hiddenLine xmlns:a14="http://schemas.microsoft.com/office/drawing/2010/main" xmlns="" w="9525">
+              <a14:hiddenLine xmlns="" xmlns:a14="http://schemas.microsoft.com/office/drawing/2010/main" w="9525">
                 <a:solidFill>
                   <a:srgbClr val="000000"/>
                 </a:solidFill>
@@ -3676,14 +3676,14 @@
           </a:ln>
           <a:extLst>
             <a:ext uri="{909E8E84-426E-40dd-AFC4-6F175D3DCCD1}">
-              <a14:hiddenFill xmlns:a14="http://schemas.microsoft.com/office/drawing/2010/main" xmlns="">
+              <a14:hiddenFill xmlns="" xmlns:a14="http://schemas.microsoft.com/office/drawing/2010/main">
                 <a:solidFill>
                   <a:srgbClr val="FFFFFF"/>
                 </a:solidFill>
               </a14:hiddenFill>
             </a:ext>
             <a:ext uri="{91240B29-F687-4f45-9708-019B960494DF}">
-              <a14:hiddenLine xmlns:a14="http://schemas.microsoft.com/office/drawing/2010/main" xmlns="" w="9525">
+              <a14:hiddenLine xmlns="" xmlns:a14="http://schemas.microsoft.com/office/drawing/2010/main" w="9525">
                 <a:solidFill>
                   <a:srgbClr val="000000"/>
                 </a:solidFill>
@@ -3904,14 +3904,14 @@
           </a:ln>
           <a:extLst>
             <a:ext uri="{909E8E84-426E-40dd-AFC4-6F175D3DCCD1}">
-              <a14:hiddenFill xmlns:a14="http://schemas.microsoft.com/office/drawing/2010/main" xmlns="">
+              <a14:hiddenFill xmlns="" xmlns:a14="http://schemas.microsoft.com/office/drawing/2010/main">
                 <a:solidFill>
                   <a:srgbClr val="FFFFFF"/>
                 </a:solidFill>
               </a14:hiddenFill>
             </a:ext>
             <a:ext uri="{91240B29-F687-4f45-9708-019B960494DF}">
-              <a14:hiddenLine xmlns:a14="http://schemas.microsoft.com/office/drawing/2010/main" xmlns="" w="9525">
+              <a14:hiddenLine xmlns="" xmlns:a14="http://schemas.microsoft.com/office/drawing/2010/main" w="9525">
                 <a:solidFill>
                   <a:srgbClr val="000000"/>
                 </a:solidFill>
@@ -4245,14 +4245,14 @@
           </a:ln>
           <a:extLst>
             <a:ext uri="{909E8E84-426E-40dd-AFC4-6F175D3DCCD1}">
-              <a14:hiddenFill xmlns:a14="http://schemas.microsoft.com/office/drawing/2010/main" xmlns="">
+              <a14:hiddenFill xmlns="" xmlns:a14="http://schemas.microsoft.com/office/drawing/2010/main">
                 <a:solidFill>
                   <a:srgbClr val="FFFFFF"/>
                 </a:solidFill>
               </a14:hiddenFill>
             </a:ext>
             <a:ext uri="{91240B29-F687-4f45-9708-019B960494DF}">
-              <a14:hiddenLine xmlns:a14="http://schemas.microsoft.com/office/drawing/2010/main" xmlns="" w="9525">
+              <a14:hiddenLine xmlns="" xmlns:a14="http://schemas.microsoft.com/office/drawing/2010/main" w="9525">
                 <a:solidFill>
                   <a:srgbClr val="000000"/>
                 </a:solidFill>
@@ -4514,14 +4514,14 @@
           </a:ln>
           <a:extLst>
             <a:ext uri="{909E8E84-426E-40dd-AFC4-6F175D3DCCD1}">
-              <a14:hiddenFill xmlns:a14="http://schemas.microsoft.com/office/drawing/2010/main" xmlns="">
+              <a14:hiddenFill xmlns="" xmlns:a14="http://schemas.microsoft.com/office/drawing/2010/main">
                 <a:solidFill>
                   <a:srgbClr val="FFFFFF"/>
                 </a:solidFill>
               </a14:hiddenFill>
             </a:ext>
             <a:ext uri="{91240B29-F687-4f45-9708-019B960494DF}">
-              <a14:hiddenLine xmlns:a14="http://schemas.microsoft.com/office/drawing/2010/main" xmlns="" w="9525">
+              <a14:hiddenLine xmlns="" xmlns:a14="http://schemas.microsoft.com/office/drawing/2010/main" w="9525">
                 <a:solidFill>
                   <a:srgbClr val="000000"/>
                 </a:solidFill>
@@ -5733,8 +5733,8 @@
         </p:blipFill>
         <p:spPr>
           <a:xfrm>
-            <a:off x="375849" y="4116023"/>
-            <a:ext cx="6475307" cy="5837143"/>
+            <a:off x="163706" y="3961787"/>
+            <a:ext cx="4960721" cy="4471825"/>
           </a:xfrm>
           <a:prstGeom prst="rect">
             <a:avLst/>
@@ -5762,8 +5762,8 @@
         </p:blipFill>
         <p:spPr>
           <a:xfrm>
-            <a:off x="361261" y="1463040"/>
-            <a:ext cx="2012227" cy="1987307"/>
+            <a:off x="111285" y="1221290"/>
+            <a:ext cx="1987369" cy="1962757"/>
           </a:xfrm>
           <a:prstGeom prst="rect">
             <a:avLst/>
@@ -5801,14 +5801,14 @@
           </a:ln>
           <a:extLst>
             <a:ext uri="{909E8E84-426E-40dd-AFC4-6F175D3DCCD1}">
-              <a14:hiddenFill xmlns:a14="http://schemas.microsoft.com/office/drawing/2010/main" xmlns="">
+              <a14:hiddenFill xmlns="" xmlns:a14="http://schemas.microsoft.com/office/drawing/2010/main">
                 <a:solidFill>
                   <a:srgbClr val="FFFFFF"/>
                 </a:solidFill>
               </a14:hiddenFill>
             </a:ext>
             <a:ext uri="{91240B29-F687-4f45-9708-019B960494DF}">
-              <a14:hiddenLine xmlns:a14="http://schemas.microsoft.com/office/drawing/2010/main" xmlns="" w="9525">
+              <a14:hiddenLine xmlns="" xmlns:a14="http://schemas.microsoft.com/office/drawing/2010/main" w="9525">
                 <a:solidFill>
                   <a:srgbClr val="000000"/>
                 </a:solidFill>
@@ -6107,7 +6107,7 @@
         </p:nvSpPr>
         <p:spPr bwMode="auto">
           <a:xfrm>
-            <a:off x="241917" y="3641805"/>
+            <a:off x="78252" y="3262156"/>
             <a:ext cx="3498850" cy="423048"/>
           </a:xfrm>
           <a:prstGeom prst="rect">
@@ -6122,14 +6122,14 @@
           </a:ln>
           <a:extLst>
             <a:ext uri="{909E8E84-426E-40dd-AFC4-6F175D3DCCD1}">
-              <a14:hiddenFill xmlns:a14="http://schemas.microsoft.com/office/drawing/2010/main" xmlns="">
+              <a14:hiddenFill xmlns="" xmlns:a14="http://schemas.microsoft.com/office/drawing/2010/main">
                 <a:solidFill>
                   <a:srgbClr val="FFFFFF"/>
                 </a:solidFill>
               </a14:hiddenFill>
             </a:ext>
             <a:ext uri="{91240B29-F687-4f45-9708-019B960494DF}">
-              <a14:hiddenLine xmlns:a14="http://schemas.microsoft.com/office/drawing/2010/main" xmlns="" w="9525">
+              <a14:hiddenLine xmlns="" xmlns:a14="http://schemas.microsoft.com/office/drawing/2010/main" w="9525">
                 <a:solidFill>
                   <a:srgbClr val="000000"/>
                 </a:solidFill>
@@ -6335,8 +6335,8 @@
         </p:nvSpPr>
         <p:spPr bwMode="auto">
           <a:xfrm>
-            <a:off x="7306605" y="1463040"/>
-            <a:ext cx="2931843" cy="3230880"/>
+            <a:off x="2177237" y="1148745"/>
+            <a:ext cx="5723472" cy="2697542"/>
           </a:xfrm>
           <a:prstGeom prst="rect">
             <a:avLst/>
@@ -6350,14 +6350,14 @@
           </a:ln>
           <a:extLst>
             <a:ext uri="{909E8E84-426E-40dd-AFC4-6F175D3DCCD1}">
-              <a14:hiddenFill xmlns:a14="http://schemas.microsoft.com/office/drawing/2010/main" xmlns="">
+              <a14:hiddenFill xmlns="" xmlns:a14="http://schemas.microsoft.com/office/drawing/2010/main">
                 <a:solidFill>
                   <a:srgbClr val="FFFFFF"/>
                 </a:solidFill>
               </a14:hiddenFill>
             </a:ext>
             <a:ext uri="{91240B29-F687-4f45-9708-019B960494DF}">
-              <a14:hiddenLine xmlns:a14="http://schemas.microsoft.com/office/drawing/2010/main" xmlns="" w="9525">
+              <a14:hiddenLine xmlns="" xmlns:a14="http://schemas.microsoft.com/office/drawing/2010/main" w="9525">
                 <a:solidFill>
                   <a:srgbClr val="000000"/>
                 </a:solidFill>
@@ -6676,8 +6676,8 @@
         </p:nvSpPr>
         <p:spPr bwMode="auto">
           <a:xfrm>
-            <a:off x="2578962" y="1530488"/>
-            <a:ext cx="4417793" cy="2217569"/>
+            <a:off x="7887507" y="1148745"/>
+            <a:ext cx="3628102" cy="2597329"/>
           </a:xfrm>
           <a:prstGeom prst="rect">
             <a:avLst/>
@@ -6691,14 +6691,14 @@
           </a:ln>
           <a:extLst>
             <a:ext uri="{909E8E84-426E-40dd-AFC4-6F175D3DCCD1}">
-              <a14:hiddenFill xmlns:a14="http://schemas.microsoft.com/office/drawing/2010/main" xmlns="">
+              <a14:hiddenFill xmlns="" xmlns:a14="http://schemas.microsoft.com/office/drawing/2010/main">
                 <a:solidFill>
                   <a:srgbClr val="FFFFFF"/>
                 </a:solidFill>
               </a14:hiddenFill>
             </a:ext>
             <a:ext uri="{91240B29-F687-4f45-9708-019B960494DF}">
-              <a14:hiddenLine xmlns:a14="http://schemas.microsoft.com/office/drawing/2010/main" xmlns="" w="9525">
+              <a14:hiddenLine xmlns="" xmlns:a14="http://schemas.microsoft.com/office/drawing/2010/main" w="9525">
                 <a:solidFill>
                   <a:srgbClr val="000000"/>
                 </a:solidFill>
@@ -6945,8 +6945,8 @@
         </p:nvSpPr>
         <p:spPr bwMode="auto">
           <a:xfrm>
-            <a:off x="7306605" y="6256463"/>
-            <a:ext cx="2828036" cy="4218525"/>
+            <a:off x="7885138" y="3571519"/>
+            <a:ext cx="3498850" cy="4218525"/>
           </a:xfrm>
           <a:prstGeom prst="rect">
             <a:avLst/>
@@ -6960,14 +6960,14 @@
           </a:ln>
           <a:extLst>
             <a:ext uri="{909E8E84-426E-40dd-AFC4-6F175D3DCCD1}">
-              <a14:hiddenFill xmlns:a14="http://schemas.microsoft.com/office/drawing/2010/main" xmlns="">
+              <a14:hiddenFill xmlns="" xmlns:a14="http://schemas.microsoft.com/office/drawing/2010/main">
                 <a:solidFill>
                   <a:srgbClr val="FFFFFF"/>
                 </a:solidFill>
               </a14:hiddenFill>
             </a:ext>
             <a:ext uri="{91240B29-F687-4f45-9708-019B960494DF}">
-              <a14:hiddenLine xmlns:a14="http://schemas.microsoft.com/office/drawing/2010/main" xmlns="" w="9525">
+              <a14:hiddenLine xmlns="" xmlns:a14="http://schemas.microsoft.com/office/drawing/2010/main" w="9525">
                 <a:solidFill>
                   <a:srgbClr val="000000"/>
                 </a:solidFill>
@@ -7171,7 +7171,7 @@
               </a:rPr>
               <a:t>Who Needs It ?</a:t>
             </a:r>
-            <a:endParaRPr lang="en-US" dirty="0">
+            <a:endParaRPr lang="en-US" sz="3600" dirty="0">
               <a:latin typeface="Arial" charset="0"/>
               <a:cs typeface="Arial" charset="0"/>
             </a:endParaRPr>
@@ -7254,11 +7254,17 @@
           <p:cNvGraphicFramePr>
             <a:graphicFrameLocks noGrp="1"/>
           </p:cNvGraphicFramePr>
-          <p:nvPr/>
+          <p:nvPr>
+            <p:extLst>
+              <p:ext uri="{D42A27DB-BD31-4B8C-83A1-F6EECF244321}">
+                <p14:modId xmlns:p14="http://schemas.microsoft.com/office/powerpoint/2010/main" val="79581047"/>
+              </p:ext>
+            </p:extLst>
+          </p:nvPr>
         </p:nvGraphicFramePr>
         <p:xfrm>
-          <a:off x="10693898" y="1617276"/>
-          <a:ext cx="3578598" cy="8260078"/>
+          <a:off x="11582399" y="1221290"/>
+          <a:ext cx="3012883" cy="8967739"/>
         </p:xfrm>
         <a:graphic>
           <a:graphicData uri="http://schemas.openxmlformats.org/drawingml/2006/table">
@@ -7267,14 +7273,14 @@
                 <a:tableStyleId>{69012ECD-51FC-41F1-AA8D-1B2483CD663E}</a:tableStyleId>
               </a:tblPr>
               <a:tblGrid>
-                <a:gridCol w="1890007">
+                <a:gridCol w="1591229">
                   <a:extLst>
                     <a:ext uri="{9D8B030D-6E8A-4147-A177-3AD203B41FA5}">
                       <a16:colId xmlns:a16="http://schemas.microsoft.com/office/drawing/2014/main" val="2063823472"/>
                     </a:ext>
                   </a:extLst>
                 </a:gridCol>
-                <a:gridCol w="1688591">
+                <a:gridCol w="1421654">
                   <a:extLst>
                     <a:ext uri="{9D8B030D-6E8A-4147-A177-3AD203B41FA5}">
                       <a16:colId xmlns:a16="http://schemas.microsoft.com/office/drawing/2014/main" val="1522963484"/>
@@ -7282,7 +7288,7 @@
                   </a:extLst>
                 </a:gridCol>
               </a:tblGrid>
-              <a:tr h="595406">
+              <a:tr h="646416">
                 <a:tc>
                   <a:txBody>
                     <a:bodyPr/>
@@ -7357,7 +7363,7 @@
                   </a:ext>
                 </a:extLst>
               </a:tr>
-              <a:tr h="1671252">
+              <a:tr h="1814432">
                 <a:tc>
                   <a:txBody>
                     <a:bodyPr/>
@@ -7440,7 +7446,7 @@
                   </a:ext>
                 </a:extLst>
               </a:tr>
-              <a:tr h="1049784">
+              <a:tr h="1139722">
                 <a:tc>
                   <a:txBody>
                     <a:bodyPr/>
@@ -7510,7 +7516,7 @@
                   </a:ext>
                 </a:extLst>
               </a:tr>
-              <a:tr h="2045239">
+              <a:tr h="2220459">
                 <a:tc>
                   <a:txBody>
                     <a:bodyPr/>
@@ -7641,7 +7647,7 @@
                   </a:ext>
                 </a:extLst>
               </a:tr>
-              <a:tr h="1262206">
+              <a:tr h="1370342">
                 <a:tc>
                   <a:txBody>
                     <a:bodyPr/>
@@ -7728,7 +7734,7 @@
                   </a:ext>
                 </a:extLst>
               </a:tr>
-              <a:tr h="1636191">
+              <a:tr h="1776368">
                 <a:tc>
                   <a:txBody>
                     <a:bodyPr/>
@@ -7819,6 +7825,672 @@
           </a:graphicData>
         </a:graphic>
       </p:graphicFrame>
+      <p:sp>
+        <p:nvSpPr>
+          <p:cNvPr id="2" name="Content Placeholder 7">
+            <a:extLst>
+              <a:ext uri="{FF2B5EF4-FFF2-40B4-BE49-F238E27FC236}">
+                <a16:creationId xmlns:a16="http://schemas.microsoft.com/office/drawing/2014/main" id="{FD109908-DFFE-A95B-F60B-9A1D8C98660E}"/>
+              </a:ext>
+            </a:extLst>
+          </p:cNvPr>
+          <p:cNvSpPr txBox="1">
+            <a:spLocks/>
+          </p:cNvSpPr>
+          <p:nvPr/>
+        </p:nvSpPr>
+        <p:spPr bwMode="auto">
+          <a:xfrm>
+            <a:off x="5003991" y="6544501"/>
+            <a:ext cx="2874613" cy="3454493"/>
+          </a:xfrm>
+          <a:prstGeom prst="rect">
+            <a:avLst/>
+          </a:prstGeom>
+          <a:noFill/>
+          <a:ln w="9525">
+            <a:noFill/>
+            <a:miter lim="800000"/>
+            <a:headEnd/>
+            <a:tailEnd/>
+          </a:ln>
+          <a:extLst>
+            <a:ext uri="{909E8E84-426E-40dd-AFC4-6F175D3DCCD1}">
+              <a14:hiddenFill xmlns="" xmlns:a14="http://schemas.microsoft.com/office/drawing/2010/main">
+                <a:solidFill>
+                  <a:srgbClr val="FFFFFF"/>
+                </a:solidFill>
+              </a14:hiddenFill>
+            </a:ext>
+            <a:ext uri="{91240B29-F687-4f45-9708-019B960494DF}">
+              <a14:hiddenLine xmlns="" xmlns:a14="http://schemas.microsoft.com/office/drawing/2010/main" w="9525">
+                <a:solidFill>
+                  <a:srgbClr val="000000"/>
+                </a:solidFill>
+                <a:miter lim="800000"/>
+                <a:headEnd/>
+                <a:tailEnd/>
+              </a14:hiddenLine>
+            </a:ext>
+          </a:extLst>
+        </p:spPr>
+        <p:txBody>
+          <a:bodyPr vert="horz" wrap="square" lIns="143378" tIns="71689" rIns="143378" bIns="71689" numCol="1" anchor="t" anchorCtr="0" compatLnSpc="1">
+            <a:prstTxWarp prst="textNoShape">
+              <a:avLst/>
+            </a:prstTxWarp>
+          </a:bodyPr>
+          <a:lstStyle>
+            <a:lvl1pPr marL="0" indent="0" algn="l" defTabSz="715963" rtl="0" eaLnBrk="0" fontAlgn="base" hangingPunct="0">
+              <a:spcBef>
+                <a:spcPct val="20000"/>
+              </a:spcBef>
+              <a:spcAft>
+                <a:spcPct val="0"/>
+              </a:spcAft>
+              <a:buFont typeface="Arial" charset="0"/>
+              <a:buNone/>
+              <a:defRPr sz="1400" kern="1200">
+                <a:solidFill>
+                  <a:schemeClr val="tx1"/>
+                </a:solidFill>
+                <a:latin typeface="Helvetica Neue"/>
+                <a:ea typeface="Geneva" charset="-128"/>
+                <a:cs typeface="Helvetica Neue"/>
+              </a:defRPr>
+            </a:lvl1pPr>
+            <a:lvl2pPr marL="1163638" indent="-447675" algn="l" defTabSz="715963" rtl="0" eaLnBrk="0" fontAlgn="base" hangingPunct="0">
+              <a:spcBef>
+                <a:spcPct val="20000"/>
+              </a:spcBef>
+              <a:spcAft>
+                <a:spcPct val="0"/>
+              </a:spcAft>
+              <a:buFont typeface="Arial" charset="0"/>
+              <a:buNone/>
+              <a:defRPr sz="1800" kern="1200">
+                <a:solidFill>
+                  <a:schemeClr val="tx1"/>
+                </a:solidFill>
+                <a:latin typeface="Helvetica Neue"/>
+                <a:ea typeface="Geneva" charset="-128"/>
+                <a:cs typeface="Helvetica Neue"/>
+              </a:defRPr>
+            </a:lvl2pPr>
+            <a:lvl3pPr marL="1790700" indent="-357188" algn="l" defTabSz="715963" rtl="0" eaLnBrk="0" fontAlgn="base" hangingPunct="0">
+              <a:spcBef>
+                <a:spcPct val="20000"/>
+              </a:spcBef>
+              <a:spcAft>
+                <a:spcPct val="0"/>
+              </a:spcAft>
+              <a:buFont typeface="Arial" charset="0"/>
+              <a:buNone/>
+              <a:defRPr sz="1800" kern="1200">
+                <a:solidFill>
+                  <a:schemeClr val="tx1"/>
+                </a:solidFill>
+                <a:latin typeface="Helvetica Neue"/>
+                <a:ea typeface="Geneva" charset="-128"/>
+                <a:cs typeface="Helvetica Neue"/>
+              </a:defRPr>
+            </a:lvl3pPr>
+            <a:lvl4pPr marL="2508250" indent="-357188" algn="l" defTabSz="715963" rtl="0" eaLnBrk="0" fontAlgn="base" hangingPunct="0">
+              <a:spcBef>
+                <a:spcPct val="20000"/>
+              </a:spcBef>
+              <a:spcAft>
+                <a:spcPct val="0"/>
+              </a:spcAft>
+              <a:buFont typeface="Arial" charset="0"/>
+              <a:buNone/>
+              <a:defRPr sz="1800" kern="1200">
+                <a:solidFill>
+                  <a:schemeClr val="tx1"/>
+                </a:solidFill>
+                <a:latin typeface="Helvetica Neue"/>
+                <a:ea typeface="Geneva" charset="-128"/>
+                <a:cs typeface="Helvetica Neue"/>
+              </a:defRPr>
+            </a:lvl4pPr>
+            <a:lvl5pPr marL="3225800" indent="-357188" algn="l" defTabSz="715963" rtl="0" eaLnBrk="0" fontAlgn="base" hangingPunct="0">
+              <a:spcBef>
+                <a:spcPct val="20000"/>
+              </a:spcBef>
+              <a:spcAft>
+                <a:spcPct val="0"/>
+              </a:spcAft>
+              <a:buFont typeface="Arial" charset="0"/>
+              <a:buNone/>
+              <a:defRPr sz="1800" kern="1200">
+                <a:solidFill>
+                  <a:schemeClr val="tx1"/>
+                </a:solidFill>
+                <a:latin typeface="Helvetica Neue"/>
+                <a:ea typeface="Geneva" charset="-128"/>
+                <a:cs typeface="Helvetica Neue"/>
+              </a:defRPr>
+            </a:lvl5pPr>
+            <a:lvl6pPr marL="3942893" indent="-358445" algn="l" defTabSz="716890" rtl="0" eaLnBrk="1" latinLnBrk="0" hangingPunct="1">
+              <a:spcBef>
+                <a:spcPct val="20000"/>
+              </a:spcBef>
+              <a:buFont typeface="Arial"/>
+              <a:buChar char="•"/>
+              <a:defRPr sz="3100" kern="1200">
+                <a:solidFill>
+                  <a:schemeClr val="tx1"/>
+                </a:solidFill>
+                <a:latin typeface="+mn-lt"/>
+                <a:ea typeface="+mn-ea"/>
+                <a:cs typeface="+mn-cs"/>
+              </a:defRPr>
+            </a:lvl6pPr>
+            <a:lvl7pPr marL="4659782" indent="-358445" algn="l" defTabSz="716890" rtl="0" eaLnBrk="1" latinLnBrk="0" hangingPunct="1">
+              <a:spcBef>
+                <a:spcPct val="20000"/>
+              </a:spcBef>
+              <a:buFont typeface="Arial"/>
+              <a:buChar char="•"/>
+              <a:defRPr sz="3100" kern="1200">
+                <a:solidFill>
+                  <a:schemeClr val="tx1"/>
+                </a:solidFill>
+                <a:latin typeface="+mn-lt"/>
+                <a:ea typeface="+mn-ea"/>
+                <a:cs typeface="+mn-cs"/>
+              </a:defRPr>
+            </a:lvl7pPr>
+            <a:lvl8pPr marL="5376672" indent="-358445" algn="l" defTabSz="716890" rtl="0" eaLnBrk="1" latinLnBrk="0" hangingPunct="1">
+              <a:spcBef>
+                <a:spcPct val="20000"/>
+              </a:spcBef>
+              <a:buFont typeface="Arial"/>
+              <a:buChar char="•"/>
+              <a:defRPr sz="3100" kern="1200">
+                <a:solidFill>
+                  <a:schemeClr val="tx1"/>
+                </a:solidFill>
+                <a:latin typeface="+mn-lt"/>
+                <a:ea typeface="+mn-ea"/>
+                <a:cs typeface="+mn-cs"/>
+              </a:defRPr>
+            </a:lvl8pPr>
+            <a:lvl9pPr marL="6093562" indent="-358445" algn="l" defTabSz="716890" rtl="0" eaLnBrk="1" latinLnBrk="0" hangingPunct="1">
+              <a:spcBef>
+                <a:spcPct val="20000"/>
+              </a:spcBef>
+              <a:buFont typeface="Arial"/>
+              <a:buChar char="•"/>
+              <a:defRPr sz="3100" kern="1200">
+                <a:solidFill>
+                  <a:schemeClr val="tx1"/>
+                </a:solidFill>
+                <a:latin typeface="+mn-lt"/>
+                <a:ea typeface="+mn-ea"/>
+                <a:cs typeface="+mn-cs"/>
+              </a:defRPr>
+            </a:lvl9pPr>
+          </a:lstStyle>
+          <a:p>
+            <a:pPr marL="0" marR="0" lvl="0" indent="0" algn="l" defTabSz="715963" rtl="0" eaLnBrk="1" fontAlgn="base" latinLnBrk="0" hangingPunct="1">
+              <a:lnSpc>
+                <a:spcPct val="150000"/>
+              </a:lnSpc>
+              <a:spcBef>
+                <a:spcPct val="0"/>
+              </a:spcBef>
+              <a:spcAft>
+                <a:spcPct val="0"/>
+              </a:spcAft>
+              <a:buClrTx/>
+              <a:buSzTx/>
+              <a:buFontTx/>
+              <a:buNone/>
+              <a:tabLst/>
+              <a:defRPr/>
+            </a:pPr>
+            <a:r>
+              <a:rPr lang="en-US" sz="1800" dirty="0">
+                <a:solidFill>
+                  <a:prstClr val="black"/>
+                </a:solidFill>
+                <a:latin typeface="Bodoni MT" charset="0"/>
+                <a:cs typeface="Arial" charset="0"/>
+              </a:rPr>
+              <a:t>What Did We Found Out ?</a:t>
+            </a:r>
+            <a:endParaRPr lang="en-US" sz="3600" dirty="0">
+              <a:latin typeface="Arial" charset="0"/>
+              <a:cs typeface="Arial" charset="0"/>
+            </a:endParaRPr>
+          </a:p>
+          <a:p>
+            <a:pPr marL="285750" indent="-285750">
+              <a:lnSpc>
+                <a:spcPct val="150000"/>
+              </a:lnSpc>
+              <a:buFont typeface="Arial" panose="020B0604020202020204" pitchFamily="34" charset="0"/>
+              <a:buChar char="•"/>
+            </a:pPr>
+            <a:r>
+              <a:rPr lang="en-US" dirty="0">
+                <a:latin typeface="Helvetica Neue" charset="0"/>
+                <a:cs typeface="Helvetica Neue" charset="0"/>
+              </a:rPr>
+              <a:t>…</a:t>
+            </a:r>
+          </a:p>
+          <a:p>
+            <a:pPr marL="285750" indent="-285750">
+              <a:lnSpc>
+                <a:spcPct val="150000"/>
+              </a:lnSpc>
+              <a:buFont typeface="Arial" panose="020B0604020202020204" pitchFamily="34" charset="0"/>
+              <a:buChar char="•"/>
+            </a:pPr>
+            <a:r>
+              <a:rPr lang="en-US" dirty="0">
+                <a:latin typeface="Helvetica Neue" charset="0"/>
+                <a:cs typeface="Helvetica Neue" charset="0"/>
+              </a:rPr>
+              <a:t>…</a:t>
+            </a:r>
+          </a:p>
+          <a:p>
+            <a:pPr marL="285750" indent="-285750">
+              <a:lnSpc>
+                <a:spcPct val="150000"/>
+              </a:lnSpc>
+              <a:buFont typeface="Arial" panose="020B0604020202020204" pitchFamily="34" charset="0"/>
+              <a:buChar char="•"/>
+            </a:pPr>
+            <a:r>
+              <a:rPr lang="en-US" dirty="0">
+                <a:latin typeface="Helvetica Neue" charset="0"/>
+                <a:cs typeface="Helvetica Neue" charset="0"/>
+              </a:rPr>
+              <a:t>…</a:t>
+            </a:r>
+          </a:p>
+        </p:txBody>
+      </p:sp>
+      <p:sp>
+        <p:nvSpPr>
+          <p:cNvPr id="3" name="Content Placeholder 7">
+            <a:extLst>
+              <a:ext uri="{FF2B5EF4-FFF2-40B4-BE49-F238E27FC236}">
+                <a16:creationId xmlns:a16="http://schemas.microsoft.com/office/drawing/2014/main" id="{942A72AE-CF57-1D01-6800-CFC842DCB107}"/>
+              </a:ext>
+            </a:extLst>
+          </p:cNvPr>
+          <p:cNvSpPr txBox="1">
+            <a:spLocks/>
+          </p:cNvSpPr>
+          <p:nvPr/>
+        </p:nvSpPr>
+        <p:spPr bwMode="auto">
+          <a:xfrm>
+            <a:off x="284603" y="8378206"/>
+            <a:ext cx="3628102" cy="1810823"/>
+          </a:xfrm>
+          <a:prstGeom prst="rect">
+            <a:avLst/>
+          </a:prstGeom>
+          <a:noFill/>
+          <a:ln w="9525">
+            <a:noFill/>
+            <a:miter lim="800000"/>
+            <a:headEnd/>
+            <a:tailEnd/>
+          </a:ln>
+          <a:extLst>
+            <a:ext uri="{909E8E84-426E-40dd-AFC4-6F175D3DCCD1}">
+              <a14:hiddenFill xmlns="" xmlns:a14="http://schemas.microsoft.com/office/drawing/2010/main">
+                <a:solidFill>
+                  <a:srgbClr val="FFFFFF"/>
+                </a:solidFill>
+              </a14:hiddenFill>
+            </a:ext>
+            <a:ext uri="{91240B29-F687-4f45-9708-019B960494DF}">
+              <a14:hiddenLine xmlns="" xmlns:a14="http://schemas.microsoft.com/office/drawing/2010/main" w="9525">
+                <a:solidFill>
+                  <a:srgbClr val="000000"/>
+                </a:solidFill>
+                <a:miter lim="800000"/>
+                <a:headEnd/>
+                <a:tailEnd/>
+              </a14:hiddenLine>
+            </a:ext>
+          </a:extLst>
+        </p:spPr>
+        <p:txBody>
+          <a:bodyPr vert="horz" wrap="square" lIns="143378" tIns="71689" rIns="143378" bIns="71689" numCol="1" anchor="t" anchorCtr="0" compatLnSpc="1">
+            <a:prstTxWarp prst="textNoShape">
+              <a:avLst/>
+            </a:prstTxWarp>
+          </a:bodyPr>
+          <a:lstStyle>
+            <a:lvl1pPr marL="0" indent="0" algn="l" defTabSz="715963" rtl="0" eaLnBrk="0" fontAlgn="base" hangingPunct="0">
+              <a:spcBef>
+                <a:spcPct val="20000"/>
+              </a:spcBef>
+              <a:spcAft>
+                <a:spcPct val="0"/>
+              </a:spcAft>
+              <a:buFont typeface="Arial" charset="0"/>
+              <a:buNone/>
+              <a:defRPr sz="1400" kern="1200">
+                <a:solidFill>
+                  <a:schemeClr val="tx1"/>
+                </a:solidFill>
+                <a:latin typeface="Helvetica Neue"/>
+                <a:ea typeface="Geneva" charset="-128"/>
+                <a:cs typeface="Helvetica Neue"/>
+              </a:defRPr>
+            </a:lvl1pPr>
+            <a:lvl2pPr marL="1163638" indent="-447675" algn="l" defTabSz="715963" rtl="0" eaLnBrk="0" fontAlgn="base" hangingPunct="0">
+              <a:spcBef>
+                <a:spcPct val="20000"/>
+              </a:spcBef>
+              <a:spcAft>
+                <a:spcPct val="0"/>
+              </a:spcAft>
+              <a:buFont typeface="Arial" charset="0"/>
+              <a:buNone/>
+              <a:defRPr sz="1800" kern="1200">
+                <a:solidFill>
+                  <a:schemeClr val="tx1"/>
+                </a:solidFill>
+                <a:latin typeface="Helvetica Neue"/>
+                <a:ea typeface="Geneva" charset="-128"/>
+                <a:cs typeface="Helvetica Neue"/>
+              </a:defRPr>
+            </a:lvl2pPr>
+            <a:lvl3pPr marL="1790700" indent="-357188" algn="l" defTabSz="715963" rtl="0" eaLnBrk="0" fontAlgn="base" hangingPunct="0">
+              <a:spcBef>
+                <a:spcPct val="20000"/>
+              </a:spcBef>
+              <a:spcAft>
+                <a:spcPct val="0"/>
+              </a:spcAft>
+              <a:buFont typeface="Arial" charset="0"/>
+              <a:buNone/>
+              <a:defRPr sz="1800" kern="1200">
+                <a:solidFill>
+                  <a:schemeClr val="tx1"/>
+                </a:solidFill>
+                <a:latin typeface="Helvetica Neue"/>
+                <a:ea typeface="Geneva" charset="-128"/>
+                <a:cs typeface="Helvetica Neue"/>
+              </a:defRPr>
+            </a:lvl3pPr>
+            <a:lvl4pPr marL="2508250" indent="-357188" algn="l" defTabSz="715963" rtl="0" eaLnBrk="0" fontAlgn="base" hangingPunct="0">
+              <a:spcBef>
+                <a:spcPct val="20000"/>
+              </a:spcBef>
+              <a:spcAft>
+                <a:spcPct val="0"/>
+              </a:spcAft>
+              <a:buFont typeface="Arial" charset="0"/>
+              <a:buNone/>
+              <a:defRPr sz="1800" kern="1200">
+                <a:solidFill>
+                  <a:schemeClr val="tx1"/>
+                </a:solidFill>
+                <a:latin typeface="Helvetica Neue"/>
+                <a:ea typeface="Geneva" charset="-128"/>
+                <a:cs typeface="Helvetica Neue"/>
+              </a:defRPr>
+            </a:lvl4pPr>
+            <a:lvl5pPr marL="3225800" indent="-357188" algn="l" defTabSz="715963" rtl="0" eaLnBrk="0" fontAlgn="base" hangingPunct="0">
+              <a:spcBef>
+                <a:spcPct val="20000"/>
+              </a:spcBef>
+              <a:spcAft>
+                <a:spcPct val="0"/>
+              </a:spcAft>
+              <a:buFont typeface="Arial" charset="0"/>
+              <a:buNone/>
+              <a:defRPr sz="1800" kern="1200">
+                <a:solidFill>
+                  <a:schemeClr val="tx1"/>
+                </a:solidFill>
+                <a:latin typeface="Helvetica Neue"/>
+                <a:ea typeface="Geneva" charset="-128"/>
+                <a:cs typeface="Helvetica Neue"/>
+              </a:defRPr>
+            </a:lvl5pPr>
+            <a:lvl6pPr marL="3942893" indent="-358445" algn="l" defTabSz="716890" rtl="0" eaLnBrk="1" latinLnBrk="0" hangingPunct="1">
+              <a:spcBef>
+                <a:spcPct val="20000"/>
+              </a:spcBef>
+              <a:buFont typeface="Arial"/>
+              <a:buChar char="•"/>
+              <a:defRPr sz="3100" kern="1200">
+                <a:solidFill>
+                  <a:schemeClr val="tx1"/>
+                </a:solidFill>
+                <a:latin typeface="+mn-lt"/>
+                <a:ea typeface="+mn-ea"/>
+                <a:cs typeface="+mn-cs"/>
+              </a:defRPr>
+            </a:lvl6pPr>
+            <a:lvl7pPr marL="4659782" indent="-358445" algn="l" defTabSz="716890" rtl="0" eaLnBrk="1" latinLnBrk="0" hangingPunct="1">
+              <a:spcBef>
+                <a:spcPct val="20000"/>
+              </a:spcBef>
+              <a:buFont typeface="Arial"/>
+              <a:buChar char="•"/>
+              <a:defRPr sz="3100" kern="1200">
+                <a:solidFill>
+                  <a:schemeClr val="tx1"/>
+                </a:solidFill>
+                <a:latin typeface="+mn-lt"/>
+                <a:ea typeface="+mn-ea"/>
+                <a:cs typeface="+mn-cs"/>
+              </a:defRPr>
+            </a:lvl7pPr>
+            <a:lvl8pPr marL="5376672" indent="-358445" algn="l" defTabSz="716890" rtl="0" eaLnBrk="1" latinLnBrk="0" hangingPunct="1">
+              <a:spcBef>
+                <a:spcPct val="20000"/>
+              </a:spcBef>
+              <a:buFont typeface="Arial"/>
+              <a:buChar char="•"/>
+              <a:defRPr sz="3100" kern="1200">
+                <a:solidFill>
+                  <a:schemeClr val="tx1"/>
+                </a:solidFill>
+                <a:latin typeface="+mn-lt"/>
+                <a:ea typeface="+mn-ea"/>
+                <a:cs typeface="+mn-cs"/>
+              </a:defRPr>
+            </a:lvl8pPr>
+            <a:lvl9pPr marL="6093562" indent="-358445" algn="l" defTabSz="716890" rtl="0" eaLnBrk="1" latinLnBrk="0" hangingPunct="1">
+              <a:spcBef>
+                <a:spcPct val="20000"/>
+              </a:spcBef>
+              <a:buFont typeface="Arial"/>
+              <a:buChar char="•"/>
+              <a:defRPr sz="3100" kern="1200">
+                <a:solidFill>
+                  <a:schemeClr val="tx1"/>
+                </a:solidFill>
+                <a:latin typeface="+mn-lt"/>
+                <a:ea typeface="+mn-ea"/>
+                <a:cs typeface="+mn-cs"/>
+              </a:defRPr>
+            </a:lvl9pPr>
+          </a:lstStyle>
+          <a:p>
+            <a:pPr marL="0" marR="0" lvl="0" indent="0" algn="l" defTabSz="715963" rtl="0" eaLnBrk="1" fontAlgn="base" latinLnBrk="0" hangingPunct="1">
+              <a:lnSpc>
+                <a:spcPct val="150000"/>
+              </a:lnSpc>
+              <a:spcBef>
+                <a:spcPct val="0"/>
+              </a:spcBef>
+              <a:spcAft>
+                <a:spcPct val="0"/>
+              </a:spcAft>
+              <a:buClrTx/>
+              <a:buSzTx/>
+              <a:buFontTx/>
+              <a:buNone/>
+              <a:tabLst/>
+              <a:defRPr/>
+            </a:pPr>
+            <a:r>
+              <a:rPr lang="en-US" sz="1800" dirty="0">
+                <a:solidFill>
+                  <a:prstClr val="black"/>
+                </a:solidFill>
+                <a:latin typeface="Bodoni MT" charset="0"/>
+                <a:cs typeface="Arial" charset="0"/>
+              </a:rPr>
+              <a:t>Who Would We Like To Thank ?</a:t>
+            </a:r>
+            <a:endParaRPr lang="en-US" sz="3600" dirty="0">
+              <a:latin typeface="Arial" charset="0"/>
+              <a:cs typeface="Arial" charset="0"/>
+            </a:endParaRPr>
+          </a:p>
+          <a:p>
+            <a:pPr marL="285750" indent="-285750">
+              <a:lnSpc>
+                <a:spcPct val="150000"/>
+              </a:lnSpc>
+              <a:buFont typeface="Arial" panose="020B0604020202020204" pitchFamily="34" charset="0"/>
+              <a:buChar char="•"/>
+            </a:pPr>
+            <a:r>
+              <a:rPr lang="en-US" dirty="0">
+                <a:latin typeface="Helvetica Neue" charset="0"/>
+                <a:cs typeface="Helvetica Neue" charset="0"/>
+              </a:rPr>
+              <a:t>Ourselves</a:t>
+            </a:r>
+          </a:p>
+          <a:p>
+            <a:pPr marL="285750" indent="-285750">
+              <a:lnSpc>
+                <a:spcPct val="150000"/>
+              </a:lnSpc>
+              <a:buFont typeface="Arial" panose="020B0604020202020204" pitchFamily="34" charset="0"/>
+              <a:buChar char="•"/>
+            </a:pPr>
+            <a:r>
+              <a:rPr lang="en-US" dirty="0">
+                <a:latin typeface="Helvetica Neue" charset="0"/>
+                <a:cs typeface="Helvetica Neue" charset="0"/>
+              </a:rPr>
+              <a:t>…</a:t>
+            </a:r>
+          </a:p>
+          <a:p>
+            <a:pPr marL="285750" indent="-285750">
+              <a:lnSpc>
+                <a:spcPct val="150000"/>
+              </a:lnSpc>
+              <a:buFont typeface="Arial" panose="020B0604020202020204" pitchFamily="34" charset="0"/>
+              <a:buChar char="•"/>
+            </a:pPr>
+            <a:r>
+              <a:rPr lang="en-US" dirty="0">
+                <a:latin typeface="Helvetica Neue" charset="0"/>
+                <a:cs typeface="Helvetica Neue" charset="0"/>
+              </a:rPr>
+              <a:t>…</a:t>
+            </a:r>
+          </a:p>
+        </p:txBody>
+      </p:sp>
+      <p:pic>
+        <p:nvPicPr>
+          <p:cNvPr id="4" name="Content Placeholder 9">
+            <a:extLst>
+              <a:ext uri="{FF2B5EF4-FFF2-40B4-BE49-F238E27FC236}">
+                <a16:creationId xmlns:a16="http://schemas.microsoft.com/office/drawing/2014/main" id="{550797FC-9775-A9C8-953E-C395FD865B76}"/>
+              </a:ext>
+            </a:extLst>
+          </p:cNvPr>
+          <p:cNvPicPr>
+            <a:picLocks noChangeAspect="1"/>
+          </p:cNvPicPr>
+          <p:nvPr/>
+        </p:nvPicPr>
+        <p:blipFill>
+          <a:blip r:embed="rId5"/>
+          <a:stretch>
+            <a:fillRect/>
+          </a:stretch>
+        </p:blipFill>
+        <p:spPr bwMode="auto">
+          <a:xfrm>
+            <a:off x="5322838" y="3904036"/>
+            <a:ext cx="2319112" cy="2524965"/>
+          </a:xfrm>
+          <a:prstGeom prst="rect">
+            <a:avLst/>
+          </a:prstGeom>
+          <a:noFill/>
+          <a:ln w="9525">
+            <a:noFill/>
+            <a:miter lim="800000"/>
+            <a:headEnd/>
+            <a:tailEnd/>
+          </a:ln>
+          <a:extLst>
+            <a:ext uri="{909E8E84-426E-40dd-AFC4-6F175D3DCCD1}">
+              <a14:hiddenFill xmlns="" xmlns:a14="http://schemas.microsoft.com/office/drawing/2010/main">
+                <a:solidFill>
+                  <a:srgbClr val="FFFFFF"/>
+                </a:solidFill>
+              </a14:hiddenFill>
+            </a:ext>
+            <a:ext uri="{91240B29-F687-4f45-9708-019B960494DF}">
+              <a14:hiddenLine xmlns="" xmlns:a14="http://schemas.microsoft.com/office/drawing/2010/main" w="9525">
+                <a:solidFill>
+                  <a:srgbClr val="000000"/>
+                </a:solidFill>
+                <a:miter lim="800000"/>
+                <a:headEnd/>
+                <a:tailEnd/>
+              </a14:hiddenLine>
+            </a:ext>
+          </a:extLst>
+        </p:spPr>
+      </p:pic>
+      <p:pic>
+        <p:nvPicPr>
+          <p:cNvPr id="6" name="Picture 5">
+            <a:extLst>
+              <a:ext uri="{FF2B5EF4-FFF2-40B4-BE49-F238E27FC236}">
+                <a16:creationId xmlns:a16="http://schemas.microsoft.com/office/drawing/2014/main" id="{B9022199-7449-F215-22CD-3EB6DAD32C56}"/>
+              </a:ext>
+            </a:extLst>
+          </p:cNvPr>
+          <p:cNvPicPr>
+            <a:picLocks noChangeAspect="1"/>
+          </p:cNvPicPr>
+          <p:nvPr/>
+        </p:nvPicPr>
+        <p:blipFill>
+          <a:blip r:embed="rId6"/>
+          <a:stretch>
+            <a:fillRect/>
+          </a:stretch>
+        </p:blipFill>
+        <p:spPr>
+          <a:xfrm>
+            <a:off x="7977810" y="7005358"/>
+            <a:ext cx="3331129" cy="3127413"/>
+          </a:xfrm>
+          <a:prstGeom prst="rect">
+            <a:avLst/>
+          </a:prstGeom>
+        </p:spPr>
+      </p:pic>
     </p:spTree>
     <p:extLst>
       <p:ext uri="{BB962C8B-B14F-4D97-AF65-F5344CB8AC3E}">

</xml_diff>